<commit_message>
Added hosted services example
</commit_message>
<xml_diff>
--- a/10.BackgroundTasks/BackgroundTasks.pptx
+++ b/10.BackgroundTasks/BackgroundTasks.pptx
@@ -5,7 +5,7 @@
     <p:sldMasterId id="2147483661" r:id="rId1"/>
   </p:sldMasterIdLst>
   <p:notesMasterIdLst>
-    <p:notesMasterId r:id="rId7"/>
+    <p:notesMasterId r:id="rId8"/>
   </p:notesMasterIdLst>
   <p:sldIdLst>
     <p:sldId id="256" r:id="rId2"/>
@@ -13,23 +13,24 @@
     <p:sldId id="263" r:id="rId4"/>
     <p:sldId id="273" r:id="rId5"/>
     <p:sldId id="270" r:id="rId6"/>
+    <p:sldId id="274" r:id="rId7"/>
   </p:sldIdLst>
   <p:sldSz cx="9144000" cy="6858000" type="screen4x3"/>
   <p:notesSz cx="6858000" cy="9144000"/>
   <p:embeddedFontLst>
     <p:embeddedFont>
       <p:font typeface="Calibri" panose="020F0502020204030204" pitchFamily="34" charset="0"/>
-      <p:regular r:id="rId8"/>
-      <p:bold r:id="rId9"/>
-      <p:italic r:id="rId10"/>
-      <p:boldItalic r:id="rId11"/>
+      <p:regular r:id="rId9"/>
+      <p:bold r:id="rId10"/>
+      <p:italic r:id="rId11"/>
+      <p:boldItalic r:id="rId12"/>
     </p:embeddedFont>
     <p:embeddedFont>
       <p:font typeface="Roboto" panose="020B0604020202020204" charset="0"/>
-      <p:regular r:id="rId12"/>
-      <p:bold r:id="rId13"/>
-      <p:italic r:id="rId14"/>
-      <p:boldItalic r:id="rId15"/>
+      <p:regular r:id="rId13"/>
+      <p:bold r:id="rId14"/>
+      <p:italic r:id="rId15"/>
+      <p:boldItalic r:id="rId16"/>
     </p:embeddedFont>
   </p:embeddedFontLst>
   <p:defaultTextStyle>
@@ -2236,6 +2237,199 @@
     <p:extLst>
       <p:ext uri="{BB962C8B-B14F-4D97-AF65-F5344CB8AC3E}">
         <p14:creationId xmlns:p14="http://schemas.microsoft.com/office/powerpoint/2010/main" val="1107873573"/>
+      </p:ext>
+    </p:extLst>
+  </p:cSld>
+  <p:clrMapOvr>
+    <a:masterClrMapping/>
+  </p:clrMapOvr>
+</p:notes>
+</file>
+
+<file path=ppt/notesSlides/notesSlide6.xml><?xml version="1.0" encoding="utf-8"?>
+<p:notes xmlns:a="http://schemas.openxmlformats.org/drawingml/2006/main" xmlns:r="http://schemas.openxmlformats.org/officeDocument/2006/relationships" xmlns:p="http://schemas.openxmlformats.org/presentationml/2006/main" showMasterSp="0" showMasterPhAnim="0">
+  <p:cSld>
+    <p:spTree>
+      <p:nvGrpSpPr>
+        <p:cNvPr id="1" name="Shape 152"/>
+        <p:cNvGrpSpPr/>
+        <p:nvPr/>
+      </p:nvGrpSpPr>
+      <p:grpSpPr>
+        <a:xfrm>
+          <a:off x="0" y="0"/>
+          <a:ext cx="0" cy="0"/>
+          <a:chOff x="0" y="0"/>
+          <a:chExt cx="0" cy="0"/>
+        </a:xfrm>
+      </p:grpSpPr>
+      <p:sp>
+        <p:nvSpPr>
+          <p:cNvPr id="153" name="Shape 153"/>
+          <p:cNvSpPr>
+            <a:spLocks noGrp="1" noRot="1" noChangeAspect="1"/>
+          </p:cNvSpPr>
+          <p:nvPr>
+            <p:ph type="sldImg" idx="2"/>
+          </p:nvPr>
+        </p:nvSpPr>
+        <p:spPr>
+          <a:xfrm>
+            <a:off x="1143000" y="685800"/>
+            <a:ext cx="4572000" cy="3429000"/>
+          </a:xfrm>
+          <a:custGeom>
+            <a:avLst/>
+            <a:gdLst/>
+            <a:ahLst/>
+            <a:cxnLst/>
+            <a:rect l="0" t="0" r="0" b="0"/>
+            <a:pathLst>
+              <a:path w="120000" h="120000" extrusionOk="0">
+                <a:moveTo>
+                  <a:pt x="0" y="0"/>
+                </a:moveTo>
+                <a:lnTo>
+                  <a:pt x="120000" y="0"/>
+                </a:lnTo>
+                <a:lnTo>
+                  <a:pt x="120000" y="120000"/>
+                </a:lnTo>
+                <a:lnTo>
+                  <a:pt x="0" y="120000"/>
+                </a:lnTo>
+                <a:close/>
+              </a:path>
+            </a:pathLst>
+          </a:custGeom>
+          <a:noFill/>
+          <a:ln w="9525" cap="flat" cmpd="sng">
+            <a:solidFill>
+              <a:srgbClr val="000000"/>
+            </a:solidFill>
+            <a:prstDash val="solid"/>
+            <a:miter lim="800000"/>
+            <a:headEnd type="none" w="med" len="med"/>
+            <a:tailEnd type="none" w="med" len="med"/>
+          </a:ln>
+        </p:spPr>
+      </p:sp>
+      <p:sp>
+        <p:nvSpPr>
+          <p:cNvPr id="154" name="Shape 154"/>
+          <p:cNvSpPr txBox="1">
+            <a:spLocks noGrp="1"/>
+          </p:cNvSpPr>
+          <p:nvPr>
+            <p:ph type="body" idx="1"/>
+          </p:nvPr>
+        </p:nvSpPr>
+        <p:spPr>
+          <a:xfrm>
+            <a:off x="685800" y="4343400"/>
+            <a:ext cx="5486400" cy="4114800"/>
+          </a:xfrm>
+          <a:prstGeom prst="rect">
+            <a:avLst/>
+          </a:prstGeom>
+          <a:noFill/>
+          <a:ln>
+            <a:noFill/>
+          </a:ln>
+        </p:spPr>
+        <p:txBody>
+          <a:bodyPr spcFirstLastPara="1" wrap="square" lIns="91425" tIns="45700" rIns="91425" bIns="45700" anchor="t" anchorCtr="0">
+            <a:noAutofit/>
+          </a:bodyPr>
+          <a:lstStyle/>
+          <a:p>
+            <a:pPr marL="0" marR="0" lvl="0" indent="0" algn="l" rtl="0">
+              <a:spcBef>
+                <a:spcPts val="0"/>
+              </a:spcBef>
+              <a:spcAft>
+                <a:spcPts val="0"/>
+              </a:spcAft>
+              <a:buNone/>
+            </a:pPr>
+            <a:endParaRPr sz="1200" b="0" i="0" u="none" strike="noStrike" cap="none">
+              <a:solidFill>
+                <a:schemeClr val="dk1"/>
+              </a:solidFill>
+              <a:latin typeface="Calibri"/>
+              <a:ea typeface="Calibri"/>
+              <a:cs typeface="Calibri"/>
+              <a:sym typeface="Calibri"/>
+            </a:endParaRPr>
+          </a:p>
+        </p:txBody>
+      </p:sp>
+      <p:sp>
+        <p:nvSpPr>
+          <p:cNvPr id="155" name="Shape 155"/>
+          <p:cNvSpPr txBox="1">
+            <a:spLocks noGrp="1"/>
+          </p:cNvSpPr>
+          <p:nvPr>
+            <p:ph type="sldNum" idx="12"/>
+          </p:nvPr>
+        </p:nvSpPr>
+        <p:spPr>
+          <a:xfrm>
+            <a:off x="3884613" y="8685213"/>
+            <a:ext cx="2971800" cy="457200"/>
+          </a:xfrm>
+          <a:prstGeom prst="rect">
+            <a:avLst/>
+          </a:prstGeom>
+          <a:noFill/>
+          <a:ln>
+            <a:noFill/>
+          </a:ln>
+        </p:spPr>
+        <p:txBody>
+          <a:bodyPr spcFirstLastPara="1" wrap="square" lIns="91425" tIns="45700" rIns="91425" bIns="45700" anchor="b" anchorCtr="0">
+            <a:noAutofit/>
+          </a:bodyPr>
+          <a:lstStyle/>
+          <a:p>
+            <a:pPr marL="0" marR="0" lvl="0" indent="0" algn="r" rtl="0">
+              <a:spcBef>
+                <a:spcPts val="0"/>
+              </a:spcBef>
+              <a:spcAft>
+                <a:spcPts val="0"/>
+              </a:spcAft>
+              <a:buNone/>
+            </a:pPr>
+            <a:fld id="{00000000-1234-1234-1234-123412341234}" type="slidenum">
+              <a:rPr lang="en-US" sz="1200" b="0" i="0" u="none" strike="noStrike" cap="none">
+                <a:solidFill>
+                  <a:schemeClr val="dk1"/>
+                </a:solidFill>
+                <a:latin typeface="Calibri"/>
+                <a:ea typeface="Calibri"/>
+                <a:cs typeface="Calibri"/>
+                <a:sym typeface="Calibri"/>
+              </a:rPr>
+              <a:t>6</a:t>
+            </a:fld>
+            <a:endParaRPr sz="1200" b="0" i="0" u="none" strike="noStrike" cap="none">
+              <a:solidFill>
+                <a:schemeClr val="dk1"/>
+              </a:solidFill>
+              <a:latin typeface="Calibri"/>
+              <a:ea typeface="Calibri"/>
+              <a:cs typeface="Calibri"/>
+              <a:sym typeface="Calibri"/>
+            </a:endParaRPr>
+          </a:p>
+        </p:txBody>
+      </p:sp>
+    </p:spTree>
+    <p:extLst>
+      <p:ext uri="{BB962C8B-B14F-4D97-AF65-F5344CB8AC3E}">
+        <p14:creationId xmlns:p14="http://schemas.microsoft.com/office/powerpoint/2010/main" val="3290185676"/>
       </p:ext>
     </p:extLst>
   </p:cSld>
@@ -19122,7 +19316,7 @@
                 <a:ea typeface="Roboto"/>
                 <a:sym typeface="Calibri"/>
               </a:rPr>
-              <a:t>Это интерфейс с помощью которого можно проще всего реализовать кэширование в </a:t>
+              <a:t>Это стандартный интерфейс с помощью которого можно реализовать кэширование в </a:t>
             </a:r>
             <a:r>
               <a:rPr lang="en-US" sz="2000" dirty="0">
@@ -19216,6 +19410,440 @@
     <p:extLst>
       <p:ext uri="{BB962C8B-B14F-4D97-AF65-F5344CB8AC3E}">
         <p14:creationId xmlns:p14="http://schemas.microsoft.com/office/powerpoint/2010/main" val="793771305"/>
+      </p:ext>
+    </p:extLst>
+  </p:cSld>
+  <p:clrMapOvr>
+    <a:masterClrMapping/>
+  </p:clrMapOvr>
+  <p:transition>
+    <p:fade/>
+  </p:transition>
+</p:sld>
+</file>
+
+<file path=ppt/slides/slide6.xml><?xml version="1.0" encoding="utf-8"?>
+<p:sld xmlns:a="http://schemas.openxmlformats.org/drawingml/2006/main" xmlns:r="http://schemas.openxmlformats.org/officeDocument/2006/relationships" xmlns:p="http://schemas.openxmlformats.org/presentationml/2006/main">
+  <p:cSld>
+    <p:spTree>
+      <p:nvGrpSpPr>
+        <p:cNvPr id="1" name="Shape 156"/>
+        <p:cNvGrpSpPr/>
+        <p:nvPr/>
+      </p:nvGrpSpPr>
+      <p:grpSpPr>
+        <a:xfrm>
+          <a:off x="0" y="0"/>
+          <a:ext cx="0" cy="0"/>
+          <a:chOff x="0" y="0"/>
+          <a:chExt cx="0" cy="0"/>
+        </a:xfrm>
+      </p:grpSpPr>
+      <p:sp>
+        <p:nvSpPr>
+          <p:cNvPr id="158" name="Shape 158"/>
+          <p:cNvSpPr txBox="1">
+            <a:spLocks noGrp="1"/>
+          </p:cNvSpPr>
+          <p:nvPr>
+            <p:ph type="title"/>
+          </p:nvPr>
+        </p:nvSpPr>
+        <p:spPr>
+          <a:xfrm>
+            <a:off x="457200" y="1730204"/>
+            <a:ext cx="8229600" cy="699963"/>
+          </a:xfrm>
+          <a:prstGeom prst="rect">
+            <a:avLst/>
+          </a:prstGeom>
+          <a:noFill/>
+          <a:ln>
+            <a:noFill/>
+          </a:ln>
+        </p:spPr>
+        <p:txBody>
+          <a:bodyPr spcFirstLastPara="1" wrap="square" lIns="91425" tIns="45700" rIns="91425" bIns="45700" anchor="ctr" anchorCtr="0">
+            <a:noAutofit/>
+          </a:bodyPr>
+          <a:lstStyle/>
+          <a:p>
+            <a:pPr marL="0" marR="0" lvl="0" indent="0" algn="l" rtl="0">
+              <a:spcBef>
+                <a:spcPts val="0"/>
+              </a:spcBef>
+              <a:spcAft>
+                <a:spcPts val="0"/>
+              </a:spcAft>
+              <a:buClr>
+                <a:schemeClr val="dk1"/>
+              </a:buClr>
+              <a:buSzPts val="4400"/>
+              <a:buFont typeface="Calibri"/>
+              <a:buNone/>
+            </a:pPr>
+            <a:r>
+              <a:rPr lang="en-US" sz="4100" b="1" dirty="0" err="1">
+                <a:solidFill>
+                  <a:srgbClr val="262626"/>
+                </a:solidFill>
+                <a:latin typeface="Roboto"/>
+                <a:ea typeface="Roboto"/>
+                <a:cs typeface="Roboto"/>
+                <a:sym typeface="Roboto"/>
+              </a:rPr>
+              <a:t>System.Threading.Channels</a:t>
+            </a:r>
+            <a:endParaRPr sz="4100" b="1" i="0" u="none" strike="noStrike" cap="none" dirty="0">
+              <a:solidFill>
+                <a:srgbClr val="262626"/>
+              </a:solidFill>
+              <a:latin typeface="Roboto"/>
+              <a:ea typeface="Roboto"/>
+              <a:cs typeface="Roboto"/>
+              <a:sym typeface="Roboto"/>
+            </a:endParaRPr>
+          </a:p>
+        </p:txBody>
+      </p:sp>
+      <p:sp>
+        <p:nvSpPr>
+          <p:cNvPr id="159" name="Shape 159"/>
+          <p:cNvSpPr/>
+          <p:nvPr/>
+        </p:nvSpPr>
+        <p:spPr>
+          <a:xfrm>
+            <a:off x="7145316" y="408237"/>
+            <a:ext cx="1856100" cy="290400"/>
+          </a:xfrm>
+          <a:prstGeom prst="roundRect">
+            <a:avLst>
+              <a:gd name="adj" fmla="val 0"/>
+            </a:avLst>
+          </a:prstGeom>
+          <a:noFill/>
+          <a:ln>
+            <a:noFill/>
+          </a:ln>
+        </p:spPr>
+        <p:txBody>
+          <a:bodyPr spcFirstLastPara="1" wrap="square" lIns="91425" tIns="45700" rIns="91425" bIns="45700" anchor="ctr" anchorCtr="0">
+            <a:noAutofit/>
+          </a:bodyPr>
+          <a:lstStyle/>
+          <a:p>
+            <a:pPr marL="0" marR="0" lvl="0" indent="0" algn="ctr" rtl="0">
+              <a:spcBef>
+                <a:spcPts val="0"/>
+              </a:spcBef>
+              <a:spcAft>
+                <a:spcPts val="0"/>
+              </a:spcAft>
+              <a:buClr>
+                <a:schemeClr val="lt1"/>
+              </a:buClr>
+              <a:buSzPts val="1200"/>
+              <a:buFont typeface="Arial"/>
+              <a:buNone/>
+            </a:pPr>
+            <a:r>
+              <a:rPr lang="en-US" sz="1500" b="1" i="0" strike="noStrike" cap="none">
+                <a:solidFill>
+                  <a:srgbClr val="262626"/>
+                </a:solidFill>
+                <a:latin typeface="Roboto"/>
+                <a:ea typeface="Roboto"/>
+                <a:cs typeface="Roboto"/>
+                <a:sym typeface="Roboto"/>
+              </a:rPr>
+              <a:t>www.itea.ua</a:t>
+            </a:r>
+            <a:endParaRPr sz="1500" b="1" i="0" strike="noStrike" cap="none">
+              <a:solidFill>
+                <a:srgbClr val="262626"/>
+              </a:solidFill>
+              <a:latin typeface="Roboto"/>
+              <a:ea typeface="Roboto"/>
+              <a:cs typeface="Roboto"/>
+              <a:sym typeface="Roboto"/>
+            </a:endParaRPr>
+          </a:p>
+        </p:txBody>
+      </p:sp>
+      <p:sp>
+        <p:nvSpPr>
+          <p:cNvPr id="160" name="Shape 160"/>
+          <p:cNvSpPr/>
+          <p:nvPr/>
+        </p:nvSpPr>
+        <p:spPr>
+          <a:xfrm rot="10800000" flipH="1">
+            <a:off x="0" y="1127850"/>
+            <a:ext cx="3143100" cy="42300"/>
+          </a:xfrm>
+          <a:prstGeom prst="rect">
+            <a:avLst/>
+          </a:prstGeom>
+          <a:solidFill>
+            <a:srgbClr val="CC0000"/>
+          </a:solidFill>
+          <a:ln>
+            <a:noFill/>
+          </a:ln>
+        </p:spPr>
+        <p:txBody>
+          <a:bodyPr spcFirstLastPara="1" wrap="square" lIns="91425" tIns="91425" rIns="91425" bIns="91425" anchor="ctr" anchorCtr="0">
+            <a:noAutofit/>
+          </a:bodyPr>
+          <a:lstStyle/>
+          <a:p>
+            <a:pPr marL="0" lvl="0" indent="0">
+              <a:spcBef>
+                <a:spcPts val="0"/>
+              </a:spcBef>
+              <a:spcAft>
+                <a:spcPts val="0"/>
+              </a:spcAft>
+              <a:buNone/>
+            </a:pPr>
+            <a:r>
+              <a:rPr lang="en-US"/>
+              <a:t>                                                                                     </a:t>
+            </a:r>
+            <a:endParaRPr/>
+          </a:p>
+        </p:txBody>
+      </p:sp>
+      <p:sp>
+        <p:nvSpPr>
+          <p:cNvPr id="161" name="Shape 161"/>
+          <p:cNvSpPr/>
+          <p:nvPr/>
+        </p:nvSpPr>
+        <p:spPr>
+          <a:xfrm rot="10800000" flipH="1">
+            <a:off x="3067050" y="1127850"/>
+            <a:ext cx="3143100" cy="42300"/>
+          </a:xfrm>
+          <a:prstGeom prst="rect">
+            <a:avLst/>
+          </a:prstGeom>
+          <a:solidFill>
+            <a:srgbClr val="262626"/>
+          </a:solidFill>
+          <a:ln>
+            <a:noFill/>
+          </a:ln>
+        </p:spPr>
+        <p:txBody>
+          <a:bodyPr spcFirstLastPara="1" wrap="square" lIns="91425" tIns="91425" rIns="91425" bIns="91425" anchor="ctr" anchorCtr="0">
+            <a:noAutofit/>
+          </a:bodyPr>
+          <a:lstStyle/>
+          <a:p>
+            <a:pPr marL="0" lvl="0" indent="0">
+              <a:spcBef>
+                <a:spcPts val="0"/>
+              </a:spcBef>
+              <a:spcAft>
+                <a:spcPts val="0"/>
+              </a:spcAft>
+              <a:buNone/>
+            </a:pPr>
+            <a:endParaRPr/>
+          </a:p>
+        </p:txBody>
+      </p:sp>
+      <p:pic>
+        <p:nvPicPr>
+          <p:cNvPr id="162" name="Shape 162"/>
+          <p:cNvPicPr preferRelativeResize="0"/>
+          <p:nvPr/>
+        </p:nvPicPr>
+        <p:blipFill>
+          <a:blip r:embed="rId3">
+            <a:alphaModFix/>
+          </a:blip>
+          <a:stretch>
+            <a:fillRect/>
+          </a:stretch>
+        </p:blipFill>
+        <p:spPr>
+          <a:xfrm>
+            <a:off x="353700" y="302000"/>
+            <a:ext cx="1741800" cy="502875"/>
+          </a:xfrm>
+          <a:prstGeom prst="rect">
+            <a:avLst/>
+          </a:prstGeom>
+          <a:noFill/>
+          <a:ln>
+            <a:noFill/>
+          </a:ln>
+        </p:spPr>
+      </p:pic>
+      <p:sp>
+        <p:nvSpPr>
+          <p:cNvPr id="163" name="Shape 163"/>
+          <p:cNvSpPr txBox="1"/>
+          <p:nvPr/>
+        </p:nvSpPr>
+        <p:spPr>
+          <a:xfrm>
+            <a:off x="481350" y="2430167"/>
+            <a:ext cx="8181300" cy="3606645"/>
+          </a:xfrm>
+          <a:prstGeom prst="rect">
+            <a:avLst/>
+          </a:prstGeom>
+          <a:noFill/>
+          <a:ln>
+            <a:noFill/>
+          </a:ln>
+        </p:spPr>
+        <p:txBody>
+          <a:bodyPr spcFirstLastPara="1" wrap="square" lIns="91425" tIns="45700" rIns="91425" bIns="45700" anchor="ctr" anchorCtr="0">
+            <a:noAutofit/>
+          </a:bodyPr>
+          <a:lstStyle/>
+          <a:p>
+            <a:pPr marL="0" marR="0" lvl="0" indent="-12700" algn="l" rtl="0">
+              <a:spcBef>
+                <a:spcPts val="3000"/>
+              </a:spcBef>
+              <a:spcAft>
+                <a:spcPts val="0"/>
+              </a:spcAft>
+              <a:buSzPts val="2000"/>
+              <a:buFont typeface="Noto Sans Symbols"/>
+              <a:buChar char="▪"/>
+            </a:pPr>
+            <a:r>
+              <a:rPr lang="en-US" sz="2000" dirty="0">
+                <a:latin typeface="Roboto"/>
+                <a:ea typeface="Roboto"/>
+                <a:sym typeface="Calibri"/>
+              </a:rPr>
+              <a:t> </a:t>
+            </a:r>
+            <a:r>
+              <a:rPr lang="ru-RU" sz="2000" dirty="0">
+                <a:latin typeface="Roboto"/>
+                <a:ea typeface="Roboto"/>
+                <a:sym typeface="Calibri"/>
+              </a:rPr>
+              <a:t>Стандартная потокобезопасная надстройка на </a:t>
+            </a:r>
+            <a:r>
+              <a:rPr lang="en-US" sz="2000" dirty="0">
+                <a:latin typeface="Roboto"/>
+                <a:ea typeface="Roboto"/>
+                <a:sym typeface="Calibri"/>
+              </a:rPr>
+              <a:t>Queue. </a:t>
+            </a:r>
+            <a:endParaRPr sz="2000" dirty="0">
+              <a:latin typeface="Roboto"/>
+              <a:ea typeface="Roboto"/>
+              <a:sym typeface="Calibri"/>
+            </a:endParaRPr>
+          </a:p>
+          <a:p>
+            <a:pPr marL="0" marR="0" lvl="0" indent="-12700" algn="l" rtl="0">
+              <a:spcBef>
+                <a:spcPts val="3000"/>
+              </a:spcBef>
+              <a:spcAft>
+                <a:spcPts val="0"/>
+              </a:spcAft>
+              <a:buSzPts val="2000"/>
+              <a:buFont typeface="Noto Sans Symbols"/>
+              <a:buChar char="▪"/>
+            </a:pPr>
+            <a:r>
+              <a:rPr lang="ru-RU" sz="2000" dirty="0">
+                <a:latin typeface="Roboto"/>
+                <a:ea typeface="Roboto"/>
+                <a:sym typeface="Calibri"/>
+              </a:rPr>
+              <a:t> Представлена в </a:t>
+            </a:r>
+            <a:r>
+              <a:rPr lang="en-US" sz="2000" dirty="0">
+                <a:latin typeface="Roboto"/>
+                <a:ea typeface="Roboto"/>
+                <a:sym typeface="Calibri"/>
+              </a:rPr>
+              <a:t>.NET Core 2.1</a:t>
+            </a:r>
+            <a:endParaRPr sz="2000" dirty="0">
+              <a:latin typeface="Roboto"/>
+              <a:ea typeface="Roboto"/>
+              <a:sym typeface="Calibri"/>
+            </a:endParaRPr>
+          </a:p>
+          <a:p>
+            <a:pPr marL="0" marR="0" lvl="0" indent="-12700" algn="l" rtl="0">
+              <a:spcBef>
+                <a:spcPts val="3000"/>
+              </a:spcBef>
+              <a:spcAft>
+                <a:spcPts val="0"/>
+              </a:spcAft>
+              <a:buSzPts val="2000"/>
+              <a:buFont typeface="Noto Sans Symbols"/>
+              <a:buChar char="▪"/>
+            </a:pPr>
+            <a:r>
+              <a:rPr lang="ru-RU" sz="2000" b="0" i="0" u="none" strike="noStrike" cap="none" dirty="0">
+                <a:latin typeface="Roboto"/>
+                <a:ea typeface="Roboto"/>
+                <a:cs typeface="Calibri"/>
+                <a:sym typeface="Roboto"/>
+              </a:rPr>
+              <a:t> Решает проблему Производитель-Потербитель (</a:t>
+            </a:r>
+            <a:r>
+              <a:rPr lang="en-US" sz="2000" b="0" i="0" u="none" strike="noStrike" cap="none" dirty="0">
+                <a:latin typeface="Roboto"/>
+                <a:ea typeface="Roboto"/>
+                <a:cs typeface="Calibri"/>
+                <a:sym typeface="Roboto"/>
+              </a:rPr>
+              <a:t>Producer-Consumer</a:t>
+            </a:r>
+            <a:r>
+              <a:rPr lang="en-US" sz="2000" dirty="0">
+                <a:latin typeface="Roboto"/>
+                <a:ea typeface="Roboto"/>
+                <a:cs typeface="Calibri"/>
+                <a:sym typeface="Roboto"/>
+              </a:rPr>
+              <a:t>)</a:t>
+            </a:r>
+            <a:r>
+              <a:rPr lang="ru-RU" sz="2000" dirty="0">
+                <a:latin typeface="Roboto"/>
+                <a:ea typeface="Roboto"/>
+                <a:cs typeface="Calibri"/>
+                <a:sym typeface="Roboto"/>
+              </a:rPr>
+              <a:t>.</a:t>
+            </a:r>
+            <a:endParaRPr sz="2000" i="0" u="none" strike="noStrike" cap="none" dirty="0">
+              <a:latin typeface="Roboto"/>
+              <a:ea typeface="Roboto"/>
+              <a:cs typeface="Roboto"/>
+              <a:sym typeface="Roboto"/>
+            </a:endParaRPr>
+          </a:p>
+        </p:txBody>
+      </p:sp>
+    </p:spTree>
+    <p:extLst>
+      <p:ext uri="{BB962C8B-B14F-4D97-AF65-F5344CB8AC3E}">
+        <p14:creationId xmlns:p14="http://schemas.microsoft.com/office/powerpoint/2010/main" val="932794134"/>
       </p:ext>
     </p:extLst>
   </p:cSld>

</xml_diff>